<commit_message>
added method sigs for abstract
</commit_message>
<xml_diff>
--- a/proj/NQL.pptx
+++ b/proj/NQL.pptx
@@ -600,7 +600,7 @@
           <a:p>
             <a:r>
               <a:rPr lang="en-US" dirty="0" smtClean="0"/>
-              <a:t>Potential difficulties of this project are: making sure different variations of the same request parse into the same query.</a:t>
+              <a:t>Potential difficulties of this project are, for example: making sure different variations of the same request parse into the same query.</a:t>
             </a:r>
             <a:r>
               <a:rPr lang="en-US" baseline="0" dirty="0" smtClean="0"/>
@@ -634,11 +634,19 @@
             </a:r>
             <a:r>
               <a:rPr lang="en-US" dirty="0" smtClean="0"/>
-              <a:t> “find math majors” might seem pretty similar, I mean both</a:t>
+              <a:t> “find math majors” might seem pretty similar, I mean, to NLTK, both</a:t>
             </a:r>
             <a:r>
               <a:rPr lang="en-US" baseline="0" dirty="0" smtClean="0"/>
-              <a:t> queries have two nouns following a verb, yet the first is asking to know that Mary is a first name, to iterate over the first name column, find Mary’s row, find the column named salary, and return that single value, whereas the latter requires knowledge that ‘major’ is a column and asks to return all entries where that value is equal to “math.” That’s like 6 differences between two syntactically similar sentences. It’s hellish.</a:t>
+              <a:t> queries are just two nouns following a verb, yet the </a:t>
+            </a:r>
+            <a:r>
+              <a:rPr lang="en-US" baseline="0" smtClean="0"/>
+              <a:t>first requires NQL </a:t>
+            </a:r>
+            <a:r>
+              <a:rPr lang="en-US" baseline="0" dirty="0" smtClean="0"/>
+              <a:t>to know that Mary is a first name, to iterate over the first name column, find Mary’s row, find the column named salary, and return that single value, whereas the latter requires knowledge that ‘major’ is a column and asks to return all entries where that value is equal to “math.” That’s like 6 differences between two syntactically similar sentences. It’s hellish.</a:t>
             </a:r>
           </a:p>
           <a:p>

</xml_diff>